<commit_message>
SOAP slajdy rozdrobene do viacerych prezentacii
</commit_message>
<xml_diff>
--- a/content/soap-web-services/kopr-soap-web-services.pptx
+++ b/content/soap-web-services/kopr-soap-web-services.pptx
@@ -240,15 +240,6 @@
             <p14:sldId id="322"/>
             <p14:sldId id="323"/>
           </p14:sldIdLst>
-        </p14:section>
-        <p14:section name="SOAP Encoding Rules" id="{662AC94E-9E15-1142-B4A2-4BCA5F9A2E30}">
-          <p14:sldIdLst/>
-        </p14:section>
-        <p14:section name="RPC/encoded" id="{0BC88F07-6D44-DB49-888F-41F82DED6B89}">
-          <p14:sldIdLst/>
-        </p14:section>
-        <p14:section name="SOAP a iné jazyky" id="{E89513E5-5BB8-E246-814B-4AA3C9D51F74}">
-          <p14:sldIdLst/>
         </p14:section>
       </p14:sectionLst>
     </p:ext>

</xml_diff>